<commit_message>
removed name of non-participator in group project
</commit_message>
<xml_diff>
--- a/ParkMe Prezi.pptx
+++ b/ParkMe Prezi.pptx
@@ -128,6 +128,10 @@
 </p:presentation>
 </file>
 
+<file path=ppt/revisionInfo.xml><?xml version="1.0" encoding="utf-8"?>
+<p1510:revInfo xmlns:a="http://schemas.openxmlformats.org/drawingml/2006/main" xmlns:r="http://schemas.openxmlformats.org/officeDocument/2006/relationships" xmlns:p1510="http://schemas.microsoft.com/office/powerpoint/2015/10/main"/>
+</file>
+
 <file path=ppt/slideLayouts/slideLayout1.xml><?xml version="1.0" encoding="utf-8"?>
 <p:sldLayout xmlns:a="http://schemas.openxmlformats.org/drawingml/2006/main" xmlns:r="http://schemas.openxmlformats.org/officeDocument/2006/relationships" xmlns:p="http://schemas.openxmlformats.org/presentationml/2006/main" type="titleOnly" preserve="1">
   <p:cSld name="Title Only">
@@ -196,7 +200,7 @@
           <a:p>
             <a:fld id="{FD0B78AA-A601-452E-B627-0E3624475364}" type="datetimeFigureOut">
               <a:rPr lang="en-US" smtClean="0"/>
-              <a:t>12/8/2017</a:t>
+              <a:t>12/9/2017</a:t>
             </a:fld>
             <a:endParaRPr lang="en-US"/>
           </a:p>
@@ -437,7 +441,7 @@
           <a:p>
             <a:fld id="{FD0B78AA-A601-452E-B627-0E3624475364}" type="datetimeFigureOut">
               <a:rPr lang="en-US" smtClean="0"/>
-              <a:t>12/8/2017</a:t>
+              <a:t>12/9/2017</a:t>
             </a:fld>
             <a:endParaRPr lang="en-US"/>
           </a:p>
@@ -1876,6 +1880,36 @@
           <a:xfrm>
             <a:off x="0" y="0"/>
             <a:ext cx="12192000" cy="6858000"/>
+          </a:xfrm>
+          <a:prstGeom prst="rect">
+            <a:avLst/>
+          </a:prstGeom>
+        </p:spPr>
+      </p:pic>
+      <p:pic>
+        <p:nvPicPr>
+          <p:cNvPr id="5" name="Picture 4">
+            <a:extLst>
+              <a:ext uri="{FF2B5EF4-FFF2-40B4-BE49-F238E27FC236}">
+                <a16:creationId xmlns:a16="http://schemas.microsoft.com/office/drawing/2014/main" id="{E0F190B9-4D95-4431-B048-2DCA288F62F8}"/>
+              </a:ext>
+            </a:extLst>
+          </p:cNvPr>
+          <p:cNvPicPr>
+            <a:picLocks noChangeAspect="1"/>
+          </p:cNvPicPr>
+          <p:nvPr/>
+        </p:nvPicPr>
+        <p:blipFill>
+          <a:blip r:embed="rId3"/>
+          <a:stretch>
+            <a:fillRect/>
+          </a:stretch>
+        </p:blipFill>
+        <p:spPr>
+          <a:xfrm>
+            <a:off x="-1" y="0"/>
+            <a:ext cx="12191999" cy="6858000"/>
           </a:xfrm>
           <a:prstGeom prst="rect">
             <a:avLst/>

</xml_diff>